<commit_message>
FY23Q2 refresh - msteams-webhooks-connectors
- run through all exercise steps in associated MSLearn module to validate good working order
- updated steps & fixed typos where necessary
- updated slides where necessary
- update code samples to reflect MSLearn HOL exercise refresh & updates
- any & all users/names/company names/pictures/IDs are not real people/tenants... all are from M365 demo tenants provided by Microsoft
</commit_message>
<xml_diff>
--- a/Teams/60 Webhooks O365 Connectors/slides.pptx
+++ b/Teams/60 Webhooks O365 Connectors/slides.pptx
@@ -3396,7 +3396,7 @@
           <a:p>
             <a:fld id="{F5D67128-0ED3-F84C-AB75-26956BD6F773}" type="datetimeFigureOut">
               <a:rPr lang="en-US" smtClean="0"/>
-              <a:t>5/26/21</a:t>
+              <a:t>12/5/22</a:t>
             </a:fld>
             <a:endParaRPr lang="en-US"/>
           </a:p>
@@ -3573,7 +3573,7 @@
           <a:p>
             <a:fld id="{9E65F564-29A8-0243-B41B-CCCF740F82F1}" type="datetimeFigureOut">
               <a:rPr lang="en-US" smtClean="0"/>
-              <a:t>5/26/21</a:t>
+              <a:t>12/5/22</a:t>
             </a:fld>
             <a:endParaRPr lang="en-US"/>
           </a:p>
@@ -12145,7 +12145,7 @@
                 <a:latin typeface="Courier New" panose="02070309020205020404" pitchFamily="49" charset="0"/>
                 <a:cs typeface="Courier New" panose="02070309020205020404" pitchFamily="49" charset="0"/>
               </a:rPr>
-              <a:t>": "1.5",</a:t>
+              <a:t>": "1.13",</a:t>
             </a:r>
           </a:p>
           <a:p>
@@ -14283,20 +14283,20 @@
 </file>
 
 <file path=customXml/item2.xml><?xml version="1.0" encoding="utf-8"?>
+<p:properties xmlns:p="http://schemas.microsoft.com/office/2006/metadata/properties" xmlns:xsi="http://www.w3.org/2001/XMLSchema-instance" xmlns:pc="http://schemas.microsoft.com/office/infopath/2007/PartnerControls">
+  <documentManagement>
+    <MediaServiceKeyPoints xmlns="61b79488-63fd-46f4-b1bf-09cb63d2085e" xsi:nil="true"/>
+  </documentManagement>
+</p:properties>
+</file>
+
+<file path=customXml/item3.xml><?xml version="1.0" encoding="utf-8"?>
 <?mso-contentType ?>
 <FormTemplates xmlns="http://schemas.microsoft.com/sharepoint/v3/contenttype/forms">
   <Display>DocumentLibraryForm</Display>
   <Edit>DocumentLibraryForm</Edit>
   <New>DocumentLibraryForm</New>
 </FormTemplates>
-</file>
-
-<file path=customXml/item3.xml><?xml version="1.0" encoding="utf-8"?>
-<p:properties xmlns:p="http://schemas.microsoft.com/office/2006/metadata/properties" xmlns:xsi="http://www.w3.org/2001/XMLSchema-instance" xmlns:pc="http://schemas.microsoft.com/office/infopath/2007/PartnerControls">
-  <documentManagement>
-    <MediaServiceKeyPoints xmlns="61b79488-63fd-46f4-b1bf-09cb63d2085e" xsi:nil="true"/>
-  </documentManagement>
-</p:properties>
 </file>
 
 <file path=customXml/itemProps1.xml><?xml version="1.0" encoding="utf-8"?>
@@ -14318,14 +14318,6 @@
 </file>
 
 <file path=customXml/itemProps2.xml><?xml version="1.0" encoding="utf-8"?>
-<ds:datastoreItem xmlns:ds="http://schemas.openxmlformats.org/officeDocument/2006/customXml" ds:itemID="{4875BE8C-CB08-400E-A21F-2497FF16C77B}">
-  <ds:schemaRefs>
-    <ds:schemaRef ds:uri="http://schemas.microsoft.com/sharepoint/v3/contenttype/forms"/>
-  </ds:schemaRefs>
-</ds:datastoreItem>
-</file>
-
-<file path=customXml/itemProps3.xml><?xml version="1.0" encoding="utf-8"?>
 <ds:datastoreItem xmlns:ds="http://schemas.openxmlformats.org/officeDocument/2006/customXml" ds:itemID="{56E9BD92-A245-451A-82D6-41724A6593BA}">
   <ds:schemaRefs>
     <ds:schemaRef ds:uri="http://purl.org/dc/elements/1.1/"/>
@@ -14341,6 +14333,14 @@
 </ds:datastoreItem>
 </file>
 
+<file path=customXml/itemProps3.xml><?xml version="1.0" encoding="utf-8"?>
+<ds:datastoreItem xmlns:ds="http://schemas.openxmlformats.org/officeDocument/2006/customXml" ds:itemID="{4875BE8C-CB08-400E-A21F-2497FF16C77B}">
+  <ds:schemaRefs>
+    <ds:schemaRef ds:uri="http://schemas.microsoft.com/sharepoint/v3/contenttype/forms"/>
+  </ds:schemaRefs>
+</ds:datastoreItem>
+</file>
+
 <file path=docMetadata/LabelInfo.xml><?xml version="1.0" encoding="utf-8"?>
 <clbl:labelList xmlns:clbl="http://schemas.microsoft.com/office/2020/mipLabelMetadata">
   <clbl:label id="{f42aa342-8706-4288-bd11-ebb85995028c}" enabled="1" method="Standard" siteId="{72f988bf-86f1-41af-91ab-2d7cd011db47}" removed="0"/>

</xml_diff>

<commit_message>
FY23Q3 refresh - msteams-webhooks-connectors
- run through all exercise steps in associated MSLearn module to validate good working order
- updated steps & fixed typos where necessary
- updated slides where necessary
- update code samples to reflect MSLearn HOL exercise refresh & updates
- any & all users/names/company names/pictures/IDs are not real people/tenants... all are from M365 demo tenants provided by Microsoft
</commit_message>
<xml_diff>
--- a/Teams/60 Webhooks O365 Connectors/slides.pptx
+++ b/Teams/60 Webhooks O365 Connectors/slides.pptx
@@ -3396,7 +3396,7 @@
           <a:p>
             <a:fld id="{F5D67128-0ED3-F84C-AB75-26956BD6F773}" type="datetimeFigureOut">
               <a:rPr lang="en-US" smtClean="0"/>
-              <a:t>12/5/22</a:t>
+              <a:t>12/14/22</a:t>
             </a:fld>
             <a:endParaRPr lang="en-US"/>
           </a:p>
@@ -3573,7 +3573,7 @@
           <a:p>
             <a:fld id="{9E65F564-29A8-0243-B41B-CCCF740F82F1}" type="datetimeFigureOut">
               <a:rPr lang="en-US" smtClean="0"/>
-              <a:t>12/5/22</a:t>
+              <a:t>12/14/22</a:t>
             </a:fld>
             <a:endParaRPr lang="en-US"/>
           </a:p>
@@ -14283,20 +14283,20 @@
 </file>
 
 <file path=customXml/item2.xml><?xml version="1.0" encoding="utf-8"?>
-<p:properties xmlns:p="http://schemas.microsoft.com/office/2006/metadata/properties" xmlns:xsi="http://www.w3.org/2001/XMLSchema-instance" xmlns:pc="http://schemas.microsoft.com/office/infopath/2007/PartnerControls">
-  <documentManagement>
-    <MediaServiceKeyPoints xmlns="61b79488-63fd-46f4-b1bf-09cb63d2085e" xsi:nil="true"/>
-  </documentManagement>
-</p:properties>
-</file>
-
-<file path=customXml/item3.xml><?xml version="1.0" encoding="utf-8"?>
 <?mso-contentType ?>
 <FormTemplates xmlns="http://schemas.microsoft.com/sharepoint/v3/contenttype/forms">
   <Display>DocumentLibraryForm</Display>
   <Edit>DocumentLibraryForm</Edit>
   <New>DocumentLibraryForm</New>
 </FormTemplates>
+</file>
+
+<file path=customXml/item3.xml><?xml version="1.0" encoding="utf-8"?>
+<p:properties xmlns:p="http://schemas.microsoft.com/office/2006/metadata/properties" xmlns:xsi="http://www.w3.org/2001/XMLSchema-instance" xmlns:pc="http://schemas.microsoft.com/office/infopath/2007/PartnerControls">
+  <documentManagement>
+    <MediaServiceKeyPoints xmlns="61b79488-63fd-46f4-b1bf-09cb63d2085e" xsi:nil="true"/>
+  </documentManagement>
+</p:properties>
 </file>
 
 <file path=customXml/itemProps1.xml><?xml version="1.0" encoding="utf-8"?>
@@ -14318,6 +14318,14 @@
 </file>
 
 <file path=customXml/itemProps2.xml><?xml version="1.0" encoding="utf-8"?>
+<ds:datastoreItem xmlns:ds="http://schemas.openxmlformats.org/officeDocument/2006/customXml" ds:itemID="{4875BE8C-CB08-400E-A21F-2497FF16C77B}">
+  <ds:schemaRefs>
+    <ds:schemaRef ds:uri="http://schemas.microsoft.com/sharepoint/v3/contenttype/forms"/>
+  </ds:schemaRefs>
+</ds:datastoreItem>
+</file>
+
+<file path=customXml/itemProps3.xml><?xml version="1.0" encoding="utf-8"?>
 <ds:datastoreItem xmlns:ds="http://schemas.openxmlformats.org/officeDocument/2006/customXml" ds:itemID="{56E9BD92-A245-451A-82D6-41724A6593BA}">
   <ds:schemaRefs>
     <ds:schemaRef ds:uri="http://purl.org/dc/elements/1.1/"/>
@@ -14333,14 +14341,6 @@
 </ds:datastoreItem>
 </file>
 
-<file path=customXml/itemProps3.xml><?xml version="1.0" encoding="utf-8"?>
-<ds:datastoreItem xmlns:ds="http://schemas.openxmlformats.org/officeDocument/2006/customXml" ds:itemID="{4875BE8C-CB08-400E-A21F-2497FF16C77B}">
-  <ds:schemaRefs>
-    <ds:schemaRef ds:uri="http://schemas.microsoft.com/sharepoint/v3/contenttype/forms"/>
-  </ds:schemaRefs>
-</ds:datastoreItem>
-</file>
-
 <file path=docMetadata/LabelInfo.xml><?xml version="1.0" encoding="utf-8"?>
 <clbl:labelList xmlns:clbl="http://schemas.microsoft.com/office/2020/mipLabelMetadata">
   <clbl:label id="{f42aa342-8706-4288-bd11-ebb85995028c}" enabled="1" method="Standard" siteId="{72f988bf-86f1-41af-91ab-2d7cd011db47}" removed="0"/>

</xml_diff>